<commit_message>
Working toward RMD for making new predictions
</commit_message>
<xml_diff>
--- a/graphical_abstract.pptx
+++ b/graphical_abstract.pptx
@@ -104,6 +104,11 @@
       </a:defRPr>
     </a:lvl9pPr>
   </p:defaultTextStyle>
+  <p:extLst>
+    <p:ext uri="{EFAFB233-063F-42B5-8137-9DF3F51BA10A}">
+      <p15:sldGuideLst xmlns:p15="http://schemas.microsoft.com/office/powerpoint/2012/main"/>
+    </p:ext>
+  </p:extLst>
 </p:presentation>
 </file>
 
@@ -254,7 +259,7 @@
           <a:p>
             <a:fld id="{3316F514-3AAC-4979-932B-9B3434F2E8C4}" type="datetimeFigureOut">
               <a:rPr lang="en-US" smtClean="0"/>
-              <a:t>11/30/2022</a:t>
+              <a:t>4/10/2023</a:t>
             </a:fld>
             <a:endParaRPr lang="en-US"/>
           </a:p>
@@ -452,7 +457,7 @@
           <a:p>
             <a:fld id="{3316F514-3AAC-4979-932B-9B3434F2E8C4}" type="datetimeFigureOut">
               <a:rPr lang="en-US" smtClean="0"/>
-              <a:t>11/30/2022</a:t>
+              <a:t>4/10/2023</a:t>
             </a:fld>
             <a:endParaRPr lang="en-US"/>
           </a:p>
@@ -660,7 +665,7 @@
           <a:p>
             <a:fld id="{3316F514-3AAC-4979-932B-9B3434F2E8C4}" type="datetimeFigureOut">
               <a:rPr lang="en-US" smtClean="0"/>
-              <a:t>11/30/2022</a:t>
+              <a:t>4/10/2023</a:t>
             </a:fld>
             <a:endParaRPr lang="en-US"/>
           </a:p>
@@ -858,7 +863,7 @@
           <a:p>
             <a:fld id="{3316F514-3AAC-4979-932B-9B3434F2E8C4}" type="datetimeFigureOut">
               <a:rPr lang="en-US" smtClean="0"/>
-              <a:t>11/30/2022</a:t>
+              <a:t>4/10/2023</a:t>
             </a:fld>
             <a:endParaRPr lang="en-US"/>
           </a:p>
@@ -1133,7 +1138,7 @@
           <a:p>
             <a:fld id="{3316F514-3AAC-4979-932B-9B3434F2E8C4}" type="datetimeFigureOut">
               <a:rPr lang="en-US" smtClean="0"/>
-              <a:t>11/30/2022</a:t>
+              <a:t>4/10/2023</a:t>
             </a:fld>
             <a:endParaRPr lang="en-US"/>
           </a:p>
@@ -1398,7 +1403,7 @@
           <a:p>
             <a:fld id="{3316F514-3AAC-4979-932B-9B3434F2E8C4}" type="datetimeFigureOut">
               <a:rPr lang="en-US" smtClean="0"/>
-              <a:t>11/30/2022</a:t>
+              <a:t>4/10/2023</a:t>
             </a:fld>
             <a:endParaRPr lang="en-US"/>
           </a:p>
@@ -1810,7 +1815,7 @@
           <a:p>
             <a:fld id="{3316F514-3AAC-4979-932B-9B3434F2E8C4}" type="datetimeFigureOut">
               <a:rPr lang="en-US" smtClean="0"/>
-              <a:t>11/30/2022</a:t>
+              <a:t>4/10/2023</a:t>
             </a:fld>
             <a:endParaRPr lang="en-US"/>
           </a:p>
@@ -1951,7 +1956,7 @@
           <a:p>
             <a:fld id="{3316F514-3AAC-4979-932B-9B3434F2E8C4}" type="datetimeFigureOut">
               <a:rPr lang="en-US" smtClean="0"/>
-              <a:t>11/30/2022</a:t>
+              <a:t>4/10/2023</a:t>
             </a:fld>
             <a:endParaRPr lang="en-US"/>
           </a:p>
@@ -2064,7 +2069,7 @@
           <a:p>
             <a:fld id="{3316F514-3AAC-4979-932B-9B3434F2E8C4}" type="datetimeFigureOut">
               <a:rPr lang="en-US" smtClean="0"/>
-              <a:t>11/30/2022</a:t>
+              <a:t>4/10/2023</a:t>
             </a:fld>
             <a:endParaRPr lang="en-US"/>
           </a:p>
@@ -2375,7 +2380,7 @@
           <a:p>
             <a:fld id="{3316F514-3AAC-4979-932B-9B3434F2E8C4}" type="datetimeFigureOut">
               <a:rPr lang="en-US" smtClean="0"/>
-              <a:t>11/30/2022</a:t>
+              <a:t>4/10/2023</a:t>
             </a:fld>
             <a:endParaRPr lang="en-US"/>
           </a:p>
@@ -2663,7 +2668,7 @@
           <a:p>
             <a:fld id="{3316F514-3AAC-4979-932B-9B3434F2E8C4}" type="datetimeFigureOut">
               <a:rPr lang="en-US" smtClean="0"/>
-              <a:t>11/30/2022</a:t>
+              <a:t>4/10/2023</a:t>
             </a:fld>
             <a:endParaRPr lang="en-US"/>
           </a:p>
@@ -2904,7 +2909,7 @@
           <a:p>
             <a:fld id="{3316F514-3AAC-4979-932B-9B3434F2E8C4}" type="datetimeFigureOut">
               <a:rPr lang="en-US" smtClean="0"/>
-              <a:t>11/30/2022</a:t>
+              <a:t>4/10/2023</a:t>
             </a:fld>
             <a:endParaRPr lang="en-US"/>
           </a:p>
@@ -3625,7 +3630,7 @@
         </p:blipFill>
         <p:spPr>
           <a:xfrm>
-            <a:off x="8846366" y="4471025"/>
+            <a:off x="8826975" y="4554364"/>
             <a:ext cx="1460726" cy="1460726"/>
           </a:xfrm>
           <a:prstGeom prst="rect">
@@ -3654,7 +3659,7 @@
         </p:nvCxnSpPr>
         <p:spPr bwMode="auto">
           <a:xfrm>
-            <a:off x="6904409" y="5201388"/>
+            <a:off x="6904409" y="5474104"/>
             <a:ext cx="1799276" cy="0"/>
           </a:xfrm>
           <a:prstGeom prst="straightConnector1">
@@ -3665,7 +3670,7 @@
           </a:solidFill>
           <a:ln w="57150" cap="flat" cmpd="sng" algn="ctr">
             <a:solidFill>
-              <a:schemeClr val="tx1"/>
+              <a:srgbClr val="F8766D"/>
             </a:solidFill>
             <a:prstDash val="solid"/>
             <a:round/>
@@ -3689,7 +3694,7 @@
         </p:nvSpPr>
         <p:spPr>
           <a:xfrm>
-            <a:off x="8884374" y="4471025"/>
+            <a:off x="8852362" y="4497291"/>
             <a:ext cx="1478827" cy="1323439"/>
           </a:xfrm>
           <a:prstGeom prst="rect">
@@ -3749,7 +3754,7 @@
           </a:solidFill>
           <a:ln w="57150" cap="flat" cmpd="sng" algn="ctr">
             <a:solidFill>
-              <a:schemeClr val="tx1"/>
+              <a:srgbClr val="7CAE00"/>
             </a:solidFill>
             <a:prstDash val="solid"/>
             <a:round/>
@@ -3773,7 +3778,7 @@
         </p:nvSpPr>
         <p:spPr>
           <a:xfrm>
-            <a:off x="8271398" y="3416130"/>
+            <a:off x="8239386" y="3442396"/>
             <a:ext cx="2704779" cy="1323439"/>
           </a:xfrm>
           <a:prstGeom prst="rect">
@@ -3793,27 +3798,47 @@
           <a:p>
             <a:pPr algn="ctr"/>
             <a:r>
-              <a:rPr lang="en-US" sz="2000" b="1" dirty="0"/>
+              <a:rPr lang="en-US" sz="2000" b="1" dirty="0">
+                <a:solidFill>
+                  <a:srgbClr val="F8766D"/>
+                </a:solidFill>
+              </a:rPr>
               <a:t>Similarity to </a:t>
             </a:r>
             <a:br>
-              <a:rPr lang="en-US" sz="2000" b="1" dirty="0"/>
+              <a:rPr lang="en-US" sz="2000" b="1" dirty="0">
+                <a:solidFill>
+                  <a:srgbClr val="F8766D"/>
+                </a:solidFill>
+              </a:rPr>
             </a:br>
             <a:r>
-              <a:rPr lang="en-US" sz="2000" b="1" dirty="0"/>
+              <a:rPr lang="en-US" sz="2000" b="1" dirty="0">
+                <a:solidFill>
+                  <a:srgbClr val="F8766D"/>
+                </a:solidFill>
+              </a:rPr>
               <a:t>Endogenous Ligands for</a:t>
             </a:r>
           </a:p>
           <a:p>
             <a:pPr algn="ctr"/>
             <a:r>
-              <a:rPr lang="en-US" sz="2000" b="1" dirty="0"/>
+              <a:rPr lang="en-US" sz="2000" b="1" dirty="0">
+                <a:solidFill>
+                  <a:srgbClr val="F8766D"/>
+                </a:solidFill>
+              </a:rPr>
               <a:t>“Transporter Affinity”</a:t>
             </a:r>
           </a:p>
           <a:p>
             <a:pPr algn="ctr"/>
-            <a:endParaRPr lang="en-US" sz="2000" b="1" dirty="0"/>
+            <a:endParaRPr lang="en-US" sz="2000" b="1" dirty="0">
+              <a:solidFill>
+                <a:srgbClr val="F8766D"/>
+              </a:solidFill>
+            </a:endParaRPr>
           </a:p>
         </p:txBody>
       </p:sp>
@@ -3831,10 +3856,10 @@
         </p:nvGrpSpPr>
         <p:grpSpPr>
           <a:xfrm>
-            <a:off x="9494520" y="1417171"/>
-            <a:ext cx="1557606" cy="1460724"/>
+            <a:off x="9939490" y="1968650"/>
+            <a:ext cx="1557606" cy="1491371"/>
             <a:chOff x="10029907" y="1428694"/>
-            <a:chExt cx="1557606" cy="1460724"/>
+            <a:chExt cx="1557606" cy="1491371"/>
           </a:xfrm>
         </p:grpSpPr>
         <p:grpSp>
@@ -3980,7 +4005,7 @@
           </p:nvSpPr>
           <p:spPr>
             <a:xfrm>
-              <a:off x="10029907" y="2297555"/>
+              <a:off x="10029907" y="2335290"/>
               <a:ext cx="1557606" cy="584775"/>
             </a:xfrm>
             <a:prstGeom prst="rect">
@@ -4024,7 +4049,7 @@
         </p:nvSpPr>
         <p:spPr>
           <a:xfrm>
-            <a:off x="8827316" y="367524"/>
+            <a:off x="9272286" y="919003"/>
             <a:ext cx="2859052" cy="1015663"/>
           </a:xfrm>
           <a:prstGeom prst="rect">
@@ -4044,21 +4069,33 @@
           <a:p>
             <a:pPr algn="ctr"/>
             <a:r>
-              <a:rPr lang="en-US" sz="2000" b="1" dirty="0"/>
+              <a:rPr lang="en-US" sz="2000" b="1" dirty="0">
+                <a:solidFill>
+                  <a:srgbClr val="7CAE00"/>
+                </a:solidFill>
+              </a:rPr>
               <a:t>Physiological</a:t>
             </a:r>
           </a:p>
           <a:p>
             <a:pPr algn="ctr"/>
             <a:r>
-              <a:rPr lang="en-US" sz="2000" b="1" dirty="0"/>
+              <a:rPr lang="en-US" sz="2000" b="1" dirty="0">
+                <a:solidFill>
+                  <a:srgbClr val="7CAE00"/>
+                </a:solidFill>
+              </a:rPr>
               <a:t>Parameters for</a:t>
             </a:r>
           </a:p>
           <a:p>
             <a:pPr algn="ctr"/>
             <a:r>
-              <a:rPr lang="en-US" sz="2000" b="1" dirty="0"/>
+              <a:rPr lang="en-US" sz="2000" b="1" dirty="0">
+                <a:solidFill>
+                  <a:srgbClr val="7CAE00"/>
+                </a:solidFill>
+              </a:rPr>
               <a:t>“Transporter Expression”</a:t>
             </a:r>
           </a:p>
@@ -4207,6 +4244,43 @@
           <a:ln w="57150" cap="flat" cmpd="sng" algn="ctr">
             <a:solidFill>
               <a:schemeClr val="tx1"/>
+            </a:solidFill>
+            <a:prstDash val="solid"/>
+            <a:round/>
+            <a:headEnd type="none" w="med" len="med"/>
+            <a:tailEnd type="triangle"/>
+          </a:ln>
+          <a:effectLst/>
+        </p:spPr>
+      </p:cxnSp>
+      <p:cxnSp>
+        <p:nvCxnSpPr>
+          <p:cNvPr id="2" name="Straight Arrow Connector 1">
+            <a:extLst>
+              <a:ext uri="{FF2B5EF4-FFF2-40B4-BE49-F238E27FC236}">
+                <a16:creationId xmlns:a16="http://schemas.microsoft.com/office/drawing/2014/main" id="{95425A08-ED13-7E84-9865-9E3EE62D9EF6}"/>
+              </a:ext>
+            </a:extLst>
+          </p:cNvPr>
+          <p:cNvCxnSpPr>
+            <a:cxnSpLocks/>
+          </p:cNvCxnSpPr>
+          <p:nvPr/>
+        </p:nvCxnSpPr>
+        <p:spPr bwMode="auto">
+          <a:xfrm>
+            <a:off x="7916974" y="3232219"/>
+            <a:ext cx="1932879" cy="0"/>
+          </a:xfrm>
+          <a:prstGeom prst="straightConnector1">
+            <a:avLst/>
+          </a:prstGeom>
+          <a:solidFill>
+            <a:schemeClr val="accent1"/>
+          </a:solidFill>
+          <a:ln w="57150" cap="flat" cmpd="sng" algn="ctr">
+            <a:solidFill>
+              <a:srgbClr val="7CAE00"/>
             </a:solidFill>
             <a:prstDash val="solid"/>
             <a:round/>

</xml_diff>